<commit_message>
Apresentação da disciplina Microcontroladores, simuladores
</commit_message>
<xml_diff>
--- a/Apresentação - Programação Microcontroladores.pptx
+++ b/Apresentação - Programação Microcontroladores.pptx
@@ -5,7 +5,7 @@
     <p:sldMasterId id="2147483648" r:id="rId1"/>
   </p:sldMasterIdLst>
   <p:notesMasterIdLst>
-    <p:notesMasterId r:id="rId28"/>
+    <p:notesMasterId r:id="rId29"/>
   </p:notesMasterIdLst>
   <p:sldIdLst>
     <p:sldId id="256" r:id="rId2"/>
@@ -18,22 +18,23 @@
     <p:sldId id="355" r:id="rId9"/>
     <p:sldId id="351" r:id="rId10"/>
     <p:sldId id="356" r:id="rId11"/>
-    <p:sldId id="352" r:id="rId12"/>
-    <p:sldId id="333" r:id="rId13"/>
-    <p:sldId id="359" r:id="rId14"/>
-    <p:sldId id="360" r:id="rId15"/>
-    <p:sldId id="334" r:id="rId16"/>
-    <p:sldId id="343" r:id="rId17"/>
-    <p:sldId id="344" r:id="rId18"/>
-    <p:sldId id="345" r:id="rId19"/>
-    <p:sldId id="346" r:id="rId20"/>
-    <p:sldId id="347" r:id="rId21"/>
-    <p:sldId id="335" r:id="rId22"/>
-    <p:sldId id="340" r:id="rId23"/>
-    <p:sldId id="336" r:id="rId24"/>
-    <p:sldId id="341" r:id="rId25"/>
-    <p:sldId id="361" r:id="rId26"/>
-    <p:sldId id="309" r:id="rId27"/>
+    <p:sldId id="362" r:id="rId12"/>
+    <p:sldId id="352" r:id="rId13"/>
+    <p:sldId id="333" r:id="rId14"/>
+    <p:sldId id="359" r:id="rId15"/>
+    <p:sldId id="360" r:id="rId16"/>
+    <p:sldId id="334" r:id="rId17"/>
+    <p:sldId id="343" r:id="rId18"/>
+    <p:sldId id="344" r:id="rId19"/>
+    <p:sldId id="345" r:id="rId20"/>
+    <p:sldId id="346" r:id="rId21"/>
+    <p:sldId id="347" r:id="rId22"/>
+    <p:sldId id="335" r:id="rId23"/>
+    <p:sldId id="340" r:id="rId24"/>
+    <p:sldId id="336" r:id="rId25"/>
+    <p:sldId id="341" r:id="rId26"/>
+    <p:sldId id="361" r:id="rId27"/>
+    <p:sldId id="309" r:id="rId28"/>
   </p:sldIdLst>
   <p:sldSz cx="9144000" cy="5143500" type="screen16x9"/>
   <p:notesSz cx="6858000" cy="9144000"/>
@@ -641,7 +642,7 @@
     </p:spTree>
     <p:extLst>
       <p:ext uri="{BB962C8B-B14F-4D97-AF65-F5344CB8AC3E}">
-        <p14:creationId xmlns:p14="http://schemas.microsoft.com/office/powerpoint/2010/main" val="1235143066"/>
+        <p14:creationId xmlns:p14="http://schemas.microsoft.com/office/powerpoint/2010/main" val="3718338346"/>
       </p:ext>
     </p:extLst>
   </p:cSld>
@@ -707,7 +708,7 @@
     </p:spTree>
     <p:extLst>
       <p:ext uri="{BB962C8B-B14F-4D97-AF65-F5344CB8AC3E}">
-        <p14:creationId xmlns:p14="http://schemas.microsoft.com/office/powerpoint/2010/main" val="1209447416"/>
+        <p14:creationId xmlns:p14="http://schemas.microsoft.com/office/powerpoint/2010/main" val="1235143066"/>
       </p:ext>
     </p:extLst>
   </p:cSld>
@@ -773,7 +774,7 @@
     </p:spTree>
     <p:extLst>
       <p:ext uri="{BB962C8B-B14F-4D97-AF65-F5344CB8AC3E}">
-        <p14:creationId xmlns:p14="http://schemas.microsoft.com/office/powerpoint/2010/main" val="499548038"/>
+        <p14:creationId xmlns:p14="http://schemas.microsoft.com/office/powerpoint/2010/main" val="1209447416"/>
       </p:ext>
     </p:extLst>
   </p:cSld>
@@ -839,7 +840,7 @@
     </p:spTree>
     <p:extLst>
       <p:ext uri="{BB962C8B-B14F-4D97-AF65-F5344CB8AC3E}">
-        <p14:creationId xmlns:p14="http://schemas.microsoft.com/office/powerpoint/2010/main" val="940003229"/>
+        <p14:creationId xmlns:p14="http://schemas.microsoft.com/office/powerpoint/2010/main" val="499548038"/>
       </p:ext>
     </p:extLst>
   </p:cSld>
@@ -905,7 +906,7 @@
     </p:spTree>
     <p:extLst>
       <p:ext uri="{BB962C8B-B14F-4D97-AF65-F5344CB8AC3E}">
-        <p14:creationId xmlns:p14="http://schemas.microsoft.com/office/powerpoint/2010/main" val="3489477623"/>
+        <p14:creationId xmlns:p14="http://schemas.microsoft.com/office/powerpoint/2010/main" val="940003229"/>
       </p:ext>
     </p:extLst>
   </p:cSld>
@@ -971,7 +972,7 @@
     </p:spTree>
     <p:extLst>
       <p:ext uri="{BB962C8B-B14F-4D97-AF65-F5344CB8AC3E}">
-        <p14:creationId xmlns:p14="http://schemas.microsoft.com/office/powerpoint/2010/main" val="1187788449"/>
+        <p14:creationId xmlns:p14="http://schemas.microsoft.com/office/powerpoint/2010/main" val="3489477623"/>
       </p:ext>
     </p:extLst>
   </p:cSld>
@@ -1037,7 +1038,7 @@
     </p:spTree>
     <p:extLst>
       <p:ext uri="{BB962C8B-B14F-4D97-AF65-F5344CB8AC3E}">
-        <p14:creationId xmlns:p14="http://schemas.microsoft.com/office/powerpoint/2010/main" val="873631164"/>
+        <p14:creationId xmlns:p14="http://schemas.microsoft.com/office/powerpoint/2010/main" val="1187788449"/>
       </p:ext>
     </p:extLst>
   </p:cSld>
@@ -1103,7 +1104,7 @@
     </p:spTree>
     <p:extLst>
       <p:ext uri="{BB962C8B-B14F-4D97-AF65-F5344CB8AC3E}">
-        <p14:creationId xmlns:p14="http://schemas.microsoft.com/office/powerpoint/2010/main" val="1014264510"/>
+        <p14:creationId xmlns:p14="http://schemas.microsoft.com/office/powerpoint/2010/main" val="873631164"/>
       </p:ext>
     </p:extLst>
   </p:cSld>
@@ -1169,7 +1170,7 @@
     </p:spTree>
     <p:extLst>
       <p:ext uri="{BB962C8B-B14F-4D97-AF65-F5344CB8AC3E}">
-        <p14:creationId xmlns:p14="http://schemas.microsoft.com/office/powerpoint/2010/main" val="2484314533"/>
+        <p14:creationId xmlns:p14="http://schemas.microsoft.com/office/powerpoint/2010/main" val="1014264510"/>
       </p:ext>
     </p:extLst>
   </p:cSld>
@@ -1235,7 +1236,7 @@
     </p:spTree>
     <p:extLst>
       <p:ext uri="{BB962C8B-B14F-4D97-AF65-F5344CB8AC3E}">
-        <p14:creationId xmlns:p14="http://schemas.microsoft.com/office/powerpoint/2010/main" val="2690279454"/>
+        <p14:creationId xmlns:p14="http://schemas.microsoft.com/office/powerpoint/2010/main" val="2484314533"/>
       </p:ext>
     </p:extLst>
   </p:cSld>
@@ -1367,7 +1368,7 @@
     </p:spTree>
     <p:extLst>
       <p:ext uri="{BB962C8B-B14F-4D97-AF65-F5344CB8AC3E}">
-        <p14:creationId xmlns:p14="http://schemas.microsoft.com/office/powerpoint/2010/main" val="371893395"/>
+        <p14:creationId xmlns:p14="http://schemas.microsoft.com/office/powerpoint/2010/main" val="2690279454"/>
       </p:ext>
     </p:extLst>
   </p:cSld>
@@ -1433,7 +1434,7 @@
     </p:spTree>
     <p:extLst>
       <p:ext uri="{BB962C8B-B14F-4D97-AF65-F5344CB8AC3E}">
-        <p14:creationId xmlns:p14="http://schemas.microsoft.com/office/powerpoint/2010/main" val="2567907220"/>
+        <p14:creationId xmlns:p14="http://schemas.microsoft.com/office/powerpoint/2010/main" val="371893395"/>
       </p:ext>
     </p:extLst>
   </p:cSld>
@@ -1499,6 +1500,72 @@
     </p:spTree>
     <p:extLst>
       <p:ext uri="{BB962C8B-B14F-4D97-AF65-F5344CB8AC3E}">
+        <p14:creationId xmlns:p14="http://schemas.microsoft.com/office/powerpoint/2010/main" val="2567907220"/>
+      </p:ext>
+    </p:extLst>
+  </p:cSld>
+  <p:clrMapOvr>
+    <a:masterClrMapping/>
+  </p:clrMapOvr>
+</p:notes>
+</file>
+
+<file path=ppt/notesSlides/notesSlide23.xml><?xml version="1.0" encoding="utf-8"?>
+<p:notes xmlns:a="http://schemas.openxmlformats.org/drawingml/2006/main" xmlns:r="http://schemas.openxmlformats.org/officeDocument/2006/relationships" xmlns:p="http://schemas.openxmlformats.org/presentationml/2006/main">
+  <p:cSld>
+    <p:spTree>
+      <p:nvGrpSpPr>
+        <p:cNvPr id="1" name=""/>
+        <p:cNvGrpSpPr/>
+        <p:nvPr/>
+      </p:nvGrpSpPr>
+      <p:grpSpPr>
+        <a:xfrm>
+          <a:off x="0" y="0"/>
+          <a:ext cx="0" cy="0"/>
+          <a:chOff x="0" y="0"/>
+          <a:chExt cx="0" cy="0"/>
+        </a:xfrm>
+      </p:grpSpPr>
+      <p:sp>
+        <p:nvSpPr>
+          <p:cNvPr id="2" name="Espaço Reservado para Imagem de Slide 1"/>
+          <p:cNvSpPr>
+            <a:spLocks noGrp="1" noRot="1" noChangeAspect="1"/>
+          </p:cNvSpPr>
+          <p:nvPr>
+            <p:ph type="sldImg"/>
+          </p:nvPr>
+        </p:nvSpPr>
+        <p:spPr>
+          <a:xfrm>
+            <a:off x="381000" y="685800"/>
+            <a:ext cx="6096000" cy="3429000"/>
+          </a:xfrm>
+        </p:spPr>
+      </p:sp>
+      <p:sp>
+        <p:nvSpPr>
+          <p:cNvPr id="3" name="Espaço Reservado para Anotações 2"/>
+          <p:cNvSpPr>
+            <a:spLocks noGrp="1"/>
+          </p:cNvSpPr>
+          <p:nvPr>
+            <p:ph type="body" idx="1"/>
+          </p:nvPr>
+        </p:nvSpPr>
+        <p:spPr/>
+        <p:txBody>
+          <a:bodyPr/>
+          <a:lstStyle/>
+          <a:p>
+            <a:endParaRPr lang="pt-BR" dirty="0"/>
+          </a:p>
+        </p:txBody>
+      </p:sp>
+    </p:spTree>
+    <p:extLst>
+      <p:ext uri="{BB962C8B-B14F-4D97-AF65-F5344CB8AC3E}">
         <p14:creationId xmlns:p14="http://schemas.microsoft.com/office/powerpoint/2010/main" val="4248038200"/>
       </p:ext>
     </p:extLst>
@@ -1509,7 +1576,7 @@
 </p:notes>
 </file>
 
-<file path=ppt/notesSlides/notesSlide23.xml><?xml version="1.0" encoding="utf-8"?>
+<file path=ppt/notesSlides/notesSlide24.xml><?xml version="1.0" encoding="utf-8"?>
 <p:notes xmlns:a="http://schemas.openxmlformats.org/drawingml/2006/main" xmlns:r="http://schemas.openxmlformats.org/officeDocument/2006/relationships" xmlns:p="http://schemas.openxmlformats.org/presentationml/2006/main">
   <p:cSld>
     <p:spTree>
@@ -2027,7 +2094,7 @@
     </p:spTree>
     <p:extLst>
       <p:ext uri="{BB962C8B-B14F-4D97-AF65-F5344CB8AC3E}">
-        <p14:creationId xmlns:p14="http://schemas.microsoft.com/office/powerpoint/2010/main" val="3718338346"/>
+        <p14:creationId xmlns:p14="http://schemas.microsoft.com/office/powerpoint/2010/main" val="2421603751"/>
       </p:ext>
     </p:extLst>
   </p:cSld>
@@ -5395,7 +5462,7 @@
                 <a:latin typeface="Times New Roman" panose="02020603050405020304" pitchFamily="18" charset="0"/>
                 <a:cs typeface="Times New Roman" panose="02020603050405020304" pitchFamily="18" charset="0"/>
               </a:rPr>
-              <a:t>Aplicações com Controladores</a:t>
+              <a:t>Aplicações com Microcontroladores</a:t>
             </a:r>
             <a:endParaRPr lang="pt-BR" altLang="pt-BR" sz="2400" dirty="0">
               <a:solidFill>
@@ -5753,6 +5820,397 @@
             <a:r>
               <a:rPr lang="pt-BR" altLang="pt-BR" sz="2400" b="1" dirty="0">
                 <a:solidFill>
+                  <a:schemeClr val="tx1"/>
+                </a:solidFill>
+                <a:latin typeface="Times New Roman" panose="02020603050405020304" pitchFamily="18" charset="0"/>
+                <a:cs typeface="Times New Roman" panose="02020603050405020304" pitchFamily="18" charset="0"/>
+              </a:rPr>
+              <a:t>				</a:t>
+            </a:r>
+            <a:r>
+              <a:rPr lang="pt-BR" altLang="pt-BR" sz="2400" b="1" dirty="0">
+                <a:solidFill>
+                  <a:srgbClr val="0070C0"/>
+                </a:solidFill>
+                <a:latin typeface="Times New Roman" panose="02020603050405020304" pitchFamily="18" charset="0"/>
+                <a:cs typeface="Times New Roman" panose="02020603050405020304" pitchFamily="18" charset="0"/>
+              </a:rPr>
+              <a:t>Simuladores de Microcontroladores</a:t>
+            </a:r>
+            <a:endParaRPr lang="pt-BR" altLang="pt-BR" sz="2400" dirty="0">
+              <a:solidFill>
+                <a:schemeClr val="tx1"/>
+              </a:solidFill>
+              <a:latin typeface="Times New Roman" panose="02020603050405020304" pitchFamily="18" charset="0"/>
+              <a:cs typeface="Times New Roman" panose="02020603050405020304" pitchFamily="18" charset="0"/>
+            </a:endParaRPr>
+          </a:p>
+          <a:p>
+            <a:pPr algn="just" eaLnBrk="0" hangingPunct="0">
+              <a:buFont typeface="Wingdings" panose="05000000000000000000" pitchFamily="2" charset="2"/>
+              <a:buChar char="ü"/>
+            </a:pPr>
+            <a:endParaRPr lang="pt-BR" altLang="pt-BR" sz="2400" dirty="0">
+              <a:solidFill>
+                <a:schemeClr val="tx1"/>
+              </a:solidFill>
+              <a:latin typeface="Times New Roman" panose="02020603050405020304" pitchFamily="18" charset="0"/>
+              <a:cs typeface="Times New Roman" panose="02020603050405020304" pitchFamily="18" charset="0"/>
+            </a:endParaRPr>
+          </a:p>
+          <a:p>
+            <a:pPr algn="just" eaLnBrk="0" hangingPunct="0">
+              <a:buFont typeface="Wingdings" panose="05000000000000000000" pitchFamily="2" charset="2"/>
+              <a:buChar char="ü"/>
+            </a:pPr>
+            <a:r>
+              <a:rPr lang="pt-BR" altLang="pt-BR" sz="2400" dirty="0" err="1">
+                <a:solidFill>
+                  <a:schemeClr val="tx1"/>
+                </a:solidFill>
+                <a:latin typeface="Times New Roman" panose="02020603050405020304" pitchFamily="18" charset="0"/>
+                <a:cs typeface="Times New Roman" panose="02020603050405020304" pitchFamily="18" charset="0"/>
+              </a:rPr>
+              <a:t>PICSimLab</a:t>
+            </a:r>
+            <a:r>
+              <a:rPr lang="pt-BR" altLang="pt-BR" sz="2400" dirty="0">
+                <a:solidFill>
+                  <a:schemeClr val="tx1"/>
+                </a:solidFill>
+                <a:latin typeface="Times New Roman" panose="02020603050405020304" pitchFamily="18" charset="0"/>
+                <a:cs typeface="Times New Roman" panose="02020603050405020304" pitchFamily="18" charset="0"/>
+              </a:rPr>
+              <a:t> (</a:t>
+            </a:r>
+            <a:r>
+              <a:rPr lang="pt-BR" altLang="pt-BR" sz="2400" dirty="0">
+                <a:solidFill>
+                  <a:schemeClr val="tx1"/>
+                </a:solidFill>
+                <a:latin typeface="Times New Roman" panose="02020603050405020304" pitchFamily="18" charset="0"/>
+                <a:cs typeface="Times New Roman" panose="02020603050405020304" pitchFamily="18" charset="0"/>
+                <a:hlinkClick r:id="rId3"/>
+              </a:rPr>
+              <a:t>https://sourceforge.net/</a:t>
+            </a:r>
+            <a:r>
+              <a:rPr lang="pt-BR" altLang="pt-BR" sz="2400" dirty="0" err="1">
+                <a:solidFill>
+                  <a:schemeClr val="tx1"/>
+                </a:solidFill>
+                <a:latin typeface="Times New Roman" panose="02020603050405020304" pitchFamily="18" charset="0"/>
+                <a:cs typeface="Times New Roman" panose="02020603050405020304" pitchFamily="18" charset="0"/>
+                <a:hlinkClick r:id="rId3"/>
+              </a:rPr>
+              <a:t>projects</a:t>
+            </a:r>
+            <a:r>
+              <a:rPr lang="pt-BR" altLang="pt-BR" sz="2400" dirty="0">
+                <a:solidFill>
+                  <a:schemeClr val="tx1"/>
+                </a:solidFill>
+                <a:latin typeface="Times New Roman" panose="02020603050405020304" pitchFamily="18" charset="0"/>
+                <a:cs typeface="Times New Roman" panose="02020603050405020304" pitchFamily="18" charset="0"/>
+                <a:hlinkClick r:id="rId3"/>
+              </a:rPr>
+              <a:t>/</a:t>
+            </a:r>
+            <a:r>
+              <a:rPr lang="pt-BR" altLang="pt-BR" sz="2400" dirty="0" err="1">
+                <a:solidFill>
+                  <a:schemeClr val="tx1"/>
+                </a:solidFill>
+                <a:latin typeface="Times New Roman" panose="02020603050405020304" pitchFamily="18" charset="0"/>
+                <a:cs typeface="Times New Roman" panose="02020603050405020304" pitchFamily="18" charset="0"/>
+                <a:hlinkClick r:id="rId3"/>
+              </a:rPr>
+              <a:t>picsim</a:t>
+            </a:r>
+            <a:r>
+              <a:rPr lang="pt-BR" altLang="pt-BR" sz="2400" dirty="0">
+                <a:solidFill>
+                  <a:schemeClr val="tx1"/>
+                </a:solidFill>
+                <a:latin typeface="Times New Roman" panose="02020603050405020304" pitchFamily="18" charset="0"/>
+                <a:cs typeface="Times New Roman" panose="02020603050405020304" pitchFamily="18" charset="0"/>
+                <a:hlinkClick r:id="rId3"/>
+              </a:rPr>
+              <a:t>/</a:t>
+            </a:r>
+            <a:r>
+              <a:rPr lang="pt-BR" altLang="pt-BR" sz="2400" dirty="0">
+                <a:solidFill>
+                  <a:schemeClr val="tx1"/>
+                </a:solidFill>
+                <a:latin typeface="Times New Roman" panose="02020603050405020304" pitchFamily="18" charset="0"/>
+                <a:cs typeface="Times New Roman" panose="02020603050405020304" pitchFamily="18" charset="0"/>
+              </a:rPr>
+              <a:t>)</a:t>
+            </a:r>
+          </a:p>
+          <a:p>
+            <a:pPr algn="just" eaLnBrk="0" hangingPunct="0">
+              <a:buFont typeface="Wingdings" panose="05000000000000000000" pitchFamily="2" charset="2"/>
+              <a:buChar char="ü"/>
+            </a:pPr>
+            <a:r>
+              <a:rPr lang="pt-BR" altLang="pt-BR" sz="2400" dirty="0">
+                <a:solidFill>
+                  <a:schemeClr val="tx1"/>
+                </a:solidFill>
+                <a:latin typeface="Times New Roman" panose="02020603050405020304" pitchFamily="18" charset="0"/>
+                <a:cs typeface="Times New Roman" panose="02020603050405020304" pitchFamily="18" charset="0"/>
+              </a:rPr>
+              <a:t>CCS (</a:t>
+            </a:r>
+            <a:r>
+              <a:rPr lang="pt-BR" altLang="pt-BR" sz="2400" dirty="0">
+                <a:solidFill>
+                  <a:schemeClr val="tx1"/>
+                </a:solidFill>
+                <a:latin typeface="Times New Roman" panose="02020603050405020304" pitchFamily="18" charset="0"/>
+                <a:cs typeface="Times New Roman" panose="02020603050405020304" pitchFamily="18" charset="0"/>
+                <a:hlinkClick r:id="rId4"/>
+              </a:rPr>
+              <a:t>https://ccsinfo.com/</a:t>
+            </a:r>
+            <a:r>
+              <a:rPr lang="pt-BR" altLang="pt-BR" sz="2400" dirty="0">
+                <a:solidFill>
+                  <a:schemeClr val="tx1"/>
+                </a:solidFill>
+                <a:latin typeface="Times New Roman" panose="02020603050405020304" pitchFamily="18" charset="0"/>
+                <a:cs typeface="Times New Roman" panose="02020603050405020304" pitchFamily="18" charset="0"/>
+              </a:rPr>
+              <a:t>)</a:t>
+            </a:r>
+          </a:p>
+          <a:p>
+            <a:pPr algn="just" eaLnBrk="0" hangingPunct="0">
+              <a:buFont typeface="Wingdings" panose="05000000000000000000" pitchFamily="2" charset="2"/>
+              <a:buChar char="ü"/>
+            </a:pPr>
+            <a:r>
+              <a:rPr lang="pt-BR" altLang="pt-BR" sz="2400" dirty="0" err="1">
+                <a:solidFill>
+                  <a:schemeClr val="tx1"/>
+                </a:solidFill>
+                <a:latin typeface="Times New Roman" panose="02020603050405020304" pitchFamily="18" charset="0"/>
+                <a:cs typeface="Times New Roman" panose="02020603050405020304" pitchFamily="18" charset="0"/>
+              </a:rPr>
+              <a:t>Proteus</a:t>
+            </a:r>
+            <a:r>
+              <a:rPr lang="pt-BR" altLang="pt-BR" sz="2400" dirty="0">
+                <a:solidFill>
+                  <a:schemeClr val="tx1"/>
+                </a:solidFill>
+                <a:latin typeface="Times New Roman" panose="02020603050405020304" pitchFamily="18" charset="0"/>
+                <a:cs typeface="Times New Roman" panose="02020603050405020304" pitchFamily="18" charset="0"/>
+              </a:rPr>
+              <a:t> Simulator (</a:t>
+            </a:r>
+            <a:r>
+              <a:rPr lang="pt-BR" altLang="pt-BR" sz="2400" dirty="0">
+                <a:solidFill>
+                  <a:schemeClr val="tx1"/>
+                </a:solidFill>
+                <a:latin typeface="Times New Roman" panose="02020603050405020304" pitchFamily="18" charset="0"/>
+                <a:cs typeface="Times New Roman" panose="02020603050405020304" pitchFamily="18" charset="0"/>
+                <a:hlinkClick r:id="rId5"/>
+              </a:rPr>
+              <a:t>https://www.labcenter.com/downloads/</a:t>
+            </a:r>
+            <a:r>
+              <a:rPr lang="pt-BR" altLang="pt-BR" sz="2400" dirty="0">
+                <a:solidFill>
+                  <a:schemeClr val="tx1"/>
+                </a:solidFill>
+                <a:latin typeface="Times New Roman" panose="02020603050405020304" pitchFamily="18" charset="0"/>
+                <a:cs typeface="Times New Roman" panose="02020603050405020304" pitchFamily="18" charset="0"/>
+              </a:rPr>
+              <a:t>)</a:t>
+            </a:r>
+          </a:p>
+        </p:txBody>
+      </p:sp>
+      <p:cxnSp>
+        <p:nvCxnSpPr>
+          <p:cNvPr id="4" name="Conector reto 3">
+            <a:extLst>
+              <a:ext uri="{FF2B5EF4-FFF2-40B4-BE49-F238E27FC236}">
+                <a16:creationId xmlns:a16="http://schemas.microsoft.com/office/drawing/2014/main" id="{53C1D5BE-B08D-43BA-9100-4319F7669DAD}"/>
+              </a:ext>
+            </a:extLst>
+          </p:cNvPr>
+          <p:cNvCxnSpPr>
+            <a:cxnSpLocks/>
+          </p:cNvCxnSpPr>
+          <p:nvPr/>
+        </p:nvCxnSpPr>
+        <p:spPr>
+          <a:xfrm flipV="1">
+            <a:off x="310728" y="902136"/>
+            <a:ext cx="8699160" cy="40954"/>
+          </a:xfrm>
+          <a:prstGeom prst="line">
+            <a:avLst/>
+          </a:prstGeom>
+          <a:ln w="38100">
+            <a:headEnd type="none" w="med" len="med"/>
+            <a:tailEnd type="none" w="med" len="med"/>
+          </a:ln>
+          <a:scene3d>
+            <a:camera prst="orthographicFront"/>
+            <a:lightRig rig="threePt" dir="t"/>
+          </a:scene3d>
+          <a:sp3d>
+            <a:bevelT prst="convex"/>
+          </a:sp3d>
+        </p:spPr>
+        <p:style>
+          <a:lnRef idx="3">
+            <a:schemeClr val="accent1"/>
+          </a:lnRef>
+          <a:fillRef idx="0">
+            <a:schemeClr val="accent1"/>
+          </a:fillRef>
+          <a:effectRef idx="2">
+            <a:schemeClr val="accent1"/>
+          </a:effectRef>
+          <a:fontRef idx="minor">
+            <a:schemeClr val="tx1"/>
+          </a:fontRef>
+        </p:style>
+      </p:cxnSp>
+    </p:spTree>
+    <p:extLst>
+      <p:ext uri="{BB962C8B-B14F-4D97-AF65-F5344CB8AC3E}">
+        <p14:creationId xmlns:p14="http://schemas.microsoft.com/office/powerpoint/2010/main" val="763981378"/>
+      </p:ext>
+    </p:extLst>
+  </p:cSld>
+  <p:clrMapOvr>
+    <a:masterClrMapping/>
+  </p:clrMapOvr>
+  <p:transition spd="med"/>
+</p:sld>
+</file>
+
+<file path=ppt/slides/slide12.xml><?xml version="1.0" encoding="utf-8"?>
+<p:sld xmlns:a="http://schemas.openxmlformats.org/drawingml/2006/main" xmlns:r="http://schemas.openxmlformats.org/officeDocument/2006/relationships" xmlns:p="http://schemas.openxmlformats.org/presentationml/2006/main">
+  <p:cSld>
+    <p:spTree>
+      <p:nvGrpSpPr>
+        <p:cNvPr id="1" name=""/>
+        <p:cNvGrpSpPr/>
+        <p:nvPr/>
+      </p:nvGrpSpPr>
+      <p:grpSpPr>
+        <a:xfrm>
+          <a:off x="0" y="0"/>
+          <a:ext cx="0" cy="0"/>
+          <a:chOff x="0" y="0"/>
+          <a:chExt cx="0" cy="0"/>
+        </a:xfrm>
+      </p:grpSpPr>
+      <p:sp>
+        <p:nvSpPr>
+          <p:cNvPr id="6" name="Title 1"/>
+          <p:cNvSpPr>
+            <a:spLocks noGrp="1"/>
+          </p:cNvSpPr>
+          <p:nvPr>
+            <p:ph type="title"/>
+          </p:nvPr>
+        </p:nvSpPr>
+        <p:spPr>
+          <a:xfrm>
+            <a:off x="457200" y="205980"/>
+            <a:ext cx="8229600" cy="857251"/>
+          </a:xfrm>
+        </p:spPr>
+        <p:txBody>
+          <a:bodyPr/>
+          <a:lstStyle/>
+          <a:p>
+            <a:r>
+              <a:rPr lang="en-US" b="1" dirty="0" err="1">
+                <a:solidFill>
+                  <a:srgbClr val="0070C0"/>
+                </a:solidFill>
+              </a:rPr>
+              <a:t>Visão</a:t>
+            </a:r>
+            <a:r>
+              <a:rPr lang="en-US" b="1" dirty="0">
+                <a:solidFill>
+                  <a:srgbClr val="0070C0"/>
+                </a:solidFill>
+              </a:rPr>
+              <a:t> </a:t>
+            </a:r>
+            <a:r>
+              <a:rPr lang="en-US" b="1" dirty="0" err="1">
+                <a:solidFill>
+                  <a:srgbClr val="0070C0"/>
+                </a:solidFill>
+              </a:rPr>
+              <a:t>Geral</a:t>
+            </a:r>
+            <a:r>
+              <a:rPr lang="en-US" b="1" dirty="0">
+                <a:solidFill>
+                  <a:srgbClr val="0070C0"/>
+                </a:solidFill>
+              </a:rPr>
+              <a:t> da </a:t>
+            </a:r>
+            <a:r>
+              <a:rPr lang="en-US" b="1" dirty="0" err="1">
+                <a:solidFill>
+                  <a:srgbClr val="0070C0"/>
+                </a:solidFill>
+              </a:rPr>
+              <a:t>Disciplina</a:t>
+            </a:r>
+            <a:endParaRPr lang="en-US" b="1" dirty="0">
+              <a:solidFill>
+                <a:srgbClr val="0070C0"/>
+              </a:solidFill>
+            </a:endParaRPr>
+          </a:p>
+        </p:txBody>
+      </p:sp>
+      <p:sp>
+        <p:nvSpPr>
+          <p:cNvPr id="8" name="Text Placeholder 2"/>
+          <p:cNvSpPr>
+            <a:spLocks noGrp="1"/>
+          </p:cNvSpPr>
+          <p:nvPr>
+            <p:ph type="body" sz="half" idx="1"/>
+          </p:nvPr>
+        </p:nvSpPr>
+        <p:spPr>
+          <a:xfrm>
+            <a:off x="142865" y="1104186"/>
+            <a:ext cx="8865056" cy="3957406"/>
+          </a:xfrm>
+        </p:spPr>
+        <p:txBody>
+          <a:bodyPr>
+            <a:noAutofit/>
+          </a:bodyPr>
+          <a:lstStyle/>
+          <a:p>
+            <a:pPr marL="0" indent="0" algn="just" eaLnBrk="0" hangingPunct="0">
+              <a:buNone/>
+            </a:pPr>
+            <a:r>
+              <a:rPr lang="pt-BR" altLang="pt-BR" sz="2400" b="1" dirty="0">
+                <a:solidFill>
                   <a:srgbClr val="FF0000"/>
                 </a:solidFill>
                 <a:latin typeface="Times New Roman" panose="02020603050405020304" pitchFamily="18" charset="0"/>
@@ -5948,7 +6406,7 @@
 </p:sld>
 </file>
 
-<file path=ppt/slides/slide12.xml><?xml version="1.0" encoding="utf-8"?>
+<file path=ppt/slides/slide13.xml><?xml version="1.0" encoding="utf-8"?>
 <p:sld xmlns:a="http://schemas.openxmlformats.org/drawingml/2006/main" xmlns:r="http://schemas.openxmlformats.org/officeDocument/2006/relationships" xmlns:p="http://schemas.openxmlformats.org/presentationml/2006/main">
   <p:cSld>
     <p:spTree>
@@ -6148,7 +6606,7 @@
 </p:sld>
 </file>
 
-<file path=ppt/slides/slide13.xml><?xml version="1.0" encoding="utf-8"?>
+<file path=ppt/slides/slide14.xml><?xml version="1.0" encoding="utf-8"?>
 <p:sld xmlns:a="http://schemas.openxmlformats.org/drawingml/2006/main" xmlns:r="http://schemas.openxmlformats.org/officeDocument/2006/relationships" xmlns:p="http://schemas.openxmlformats.org/presentationml/2006/main">
   <p:cSld>
     <p:spTree>
@@ -6348,7 +6806,7 @@
 </p:sld>
 </file>
 
-<file path=ppt/slides/slide14.xml><?xml version="1.0" encoding="utf-8"?>
+<file path=ppt/slides/slide15.xml><?xml version="1.0" encoding="utf-8"?>
 <p:sld xmlns:a="http://schemas.openxmlformats.org/drawingml/2006/main" xmlns:r="http://schemas.openxmlformats.org/officeDocument/2006/relationships" xmlns:p="http://schemas.openxmlformats.org/presentationml/2006/main">
   <p:cSld>
     <p:spTree>
@@ -6519,7 +6977,7 @@
 </p:sld>
 </file>
 
-<file path=ppt/slides/slide15.xml><?xml version="1.0" encoding="utf-8"?>
+<file path=ppt/slides/slide16.xml><?xml version="1.0" encoding="utf-8"?>
 <p:sld xmlns:a="http://schemas.openxmlformats.org/drawingml/2006/main" xmlns:r="http://schemas.openxmlformats.org/officeDocument/2006/relationships" xmlns:p="http://schemas.openxmlformats.org/presentationml/2006/main">
   <p:cSld>
     <p:spTree>
@@ -6761,7 +7219,7 @@
 </p:sld>
 </file>
 
-<file path=ppt/slides/slide16.xml><?xml version="1.0" encoding="utf-8"?>
+<file path=ppt/slides/slide17.xml><?xml version="1.0" encoding="utf-8"?>
 <p:sld xmlns:a="http://schemas.openxmlformats.org/drawingml/2006/main" xmlns:r="http://schemas.openxmlformats.org/officeDocument/2006/relationships" xmlns:p="http://schemas.openxmlformats.org/presentationml/2006/main">
   <p:cSld>
     <p:spTree>
@@ -7053,7 +7511,7 @@
 </p:sld>
 </file>
 
-<file path=ppt/slides/slide17.xml><?xml version="1.0" encoding="utf-8"?>
+<file path=ppt/slides/slide18.xml><?xml version="1.0" encoding="utf-8"?>
 <p:sld xmlns:a="http://schemas.openxmlformats.org/drawingml/2006/main" xmlns:r="http://schemas.openxmlformats.org/officeDocument/2006/relationships" xmlns:p="http://schemas.openxmlformats.org/presentationml/2006/main">
   <p:cSld>
     <p:spTree>
@@ -7342,7 +7800,7 @@
 </p:sld>
 </file>
 
-<file path=ppt/slides/slide18.xml><?xml version="1.0" encoding="utf-8"?>
+<file path=ppt/slides/slide19.xml><?xml version="1.0" encoding="utf-8"?>
 <p:sld xmlns:a="http://schemas.openxmlformats.org/drawingml/2006/main" xmlns:r="http://schemas.openxmlformats.org/officeDocument/2006/relationships" xmlns:p="http://schemas.openxmlformats.org/presentationml/2006/main">
   <p:cSld>
     <p:spTree>
@@ -7574,263 +8032,6 @@
     <p:extLst>
       <p:ext uri="{BB962C8B-B14F-4D97-AF65-F5344CB8AC3E}">
         <p14:creationId xmlns:p14="http://schemas.microsoft.com/office/powerpoint/2010/main" val="1196225475"/>
-      </p:ext>
-    </p:extLst>
-  </p:cSld>
-  <p:clrMapOvr>
-    <a:masterClrMapping/>
-  </p:clrMapOvr>
-  <p:transition spd="med"/>
-</p:sld>
-</file>
-
-<file path=ppt/slides/slide19.xml><?xml version="1.0" encoding="utf-8"?>
-<p:sld xmlns:a="http://schemas.openxmlformats.org/drawingml/2006/main" xmlns:r="http://schemas.openxmlformats.org/officeDocument/2006/relationships" xmlns:p="http://schemas.openxmlformats.org/presentationml/2006/main">
-  <p:cSld>
-    <p:spTree>
-      <p:nvGrpSpPr>
-        <p:cNvPr id="1" name=""/>
-        <p:cNvGrpSpPr/>
-        <p:nvPr/>
-      </p:nvGrpSpPr>
-      <p:grpSpPr>
-        <a:xfrm>
-          <a:off x="0" y="0"/>
-          <a:ext cx="0" cy="0"/>
-          <a:chOff x="0" y="0"/>
-          <a:chExt cx="0" cy="0"/>
-        </a:xfrm>
-      </p:grpSpPr>
-      <p:sp>
-        <p:nvSpPr>
-          <p:cNvPr id="6" name="Title 1"/>
-          <p:cNvSpPr>
-            <a:spLocks noGrp="1"/>
-          </p:cNvSpPr>
-          <p:nvPr>
-            <p:ph type="title"/>
-          </p:nvPr>
-        </p:nvSpPr>
-        <p:spPr>
-          <a:xfrm>
-            <a:off x="457200" y="205980"/>
-            <a:ext cx="8229600" cy="857251"/>
-          </a:xfrm>
-        </p:spPr>
-        <p:txBody>
-          <a:bodyPr/>
-          <a:lstStyle/>
-          <a:p>
-            <a:r>
-              <a:rPr lang="en-US" b="1" dirty="0" err="1">
-                <a:solidFill>
-                  <a:srgbClr val="0070C0"/>
-                </a:solidFill>
-              </a:rPr>
-              <a:t>Unidades</a:t>
-            </a:r>
-            <a:r>
-              <a:rPr lang="en-US" b="1" dirty="0">
-                <a:solidFill>
-                  <a:srgbClr val="0070C0"/>
-                </a:solidFill>
-              </a:rPr>
-              <a:t>/</a:t>
-            </a:r>
-            <a:r>
-              <a:rPr lang="en-US" b="1" dirty="0" err="1">
-                <a:solidFill>
-                  <a:srgbClr val="0070C0"/>
-                </a:solidFill>
-              </a:rPr>
-              <a:t>Conteúdos</a:t>
-            </a:r>
-            <a:endParaRPr lang="en-US" b="1" dirty="0">
-              <a:solidFill>
-                <a:srgbClr val="0070C0"/>
-              </a:solidFill>
-            </a:endParaRPr>
-          </a:p>
-        </p:txBody>
-      </p:sp>
-      <p:sp>
-        <p:nvSpPr>
-          <p:cNvPr id="8" name="Text Placeholder 2"/>
-          <p:cNvSpPr>
-            <a:spLocks noGrp="1"/>
-          </p:cNvSpPr>
-          <p:nvPr>
-            <p:ph type="body" sz="half" idx="1"/>
-          </p:nvPr>
-        </p:nvSpPr>
-        <p:spPr>
-          <a:xfrm>
-            <a:off x="142865" y="1104186"/>
-            <a:ext cx="8865056" cy="3943803"/>
-          </a:xfrm>
-        </p:spPr>
-        <p:txBody>
-          <a:bodyPr>
-            <a:noAutofit/>
-          </a:bodyPr>
-          <a:lstStyle/>
-          <a:p>
-            <a:pPr marL="457200" indent="-457200" algn="just" eaLnBrk="0" hangingPunct="0">
-              <a:buAutoNum type="arabicPeriod" startAt="5"/>
-            </a:pPr>
-            <a:r>
-              <a:rPr lang="pt-BR" sz="2200" dirty="0">
-                <a:solidFill>
-                  <a:schemeClr val="tx1"/>
-                </a:solidFill>
-                <a:latin typeface="Times New Roman" panose="02020603050405020304" pitchFamily="18" charset="0"/>
-                <a:cs typeface="Times New Roman" panose="02020603050405020304" pitchFamily="18" charset="0"/>
-              </a:rPr>
-              <a:t>PROJETOS COM MICROCONTROLADORES</a:t>
-            </a:r>
-          </a:p>
-          <a:p>
-            <a:pPr marL="0" indent="0" algn="just" eaLnBrk="0" hangingPunct="0">
-              <a:buNone/>
-            </a:pPr>
-            <a:endParaRPr lang="pt-BR" sz="2200" dirty="0">
-              <a:solidFill>
-                <a:schemeClr val="tx1"/>
-              </a:solidFill>
-              <a:latin typeface="Times New Roman" panose="02020603050405020304" pitchFamily="18" charset="0"/>
-              <a:cs typeface="Times New Roman" panose="02020603050405020304" pitchFamily="18" charset="0"/>
-            </a:endParaRPr>
-          </a:p>
-          <a:p>
-            <a:pPr marL="0" indent="0" algn="just" eaLnBrk="0" hangingPunct="0">
-              <a:buNone/>
-            </a:pPr>
-            <a:r>
-              <a:rPr lang="pt-BR" sz="2200" dirty="0">
-                <a:solidFill>
-                  <a:schemeClr val="tx1"/>
-                </a:solidFill>
-                <a:latin typeface="Times New Roman" panose="02020603050405020304" pitchFamily="18" charset="0"/>
-                <a:cs typeface="Times New Roman" panose="02020603050405020304" pitchFamily="18" charset="0"/>
-              </a:rPr>
-              <a:t>5.1. Plataformas de hardware e software para um projeto com microcontrolador</a:t>
-            </a:r>
-          </a:p>
-          <a:p>
-            <a:pPr marL="0" indent="0" algn="just" eaLnBrk="0" hangingPunct="0">
-              <a:buNone/>
-            </a:pPr>
-            <a:r>
-              <a:rPr lang="pt-BR" sz="2200" dirty="0">
-                <a:solidFill>
-                  <a:schemeClr val="tx1"/>
-                </a:solidFill>
-                <a:latin typeface="Times New Roman" panose="02020603050405020304" pitchFamily="18" charset="0"/>
-                <a:cs typeface="Times New Roman" panose="02020603050405020304" pitchFamily="18" charset="0"/>
-              </a:rPr>
-              <a:t>5.2. Limitações dos microcontroladores para a especificação de projetos embarcados de alto desempenho</a:t>
-            </a:r>
-          </a:p>
-          <a:p>
-            <a:pPr marL="0" indent="0" algn="just" eaLnBrk="0" hangingPunct="0">
-              <a:buNone/>
-            </a:pPr>
-            <a:r>
-              <a:rPr lang="pt-BR" sz="2200" dirty="0">
-                <a:solidFill>
-                  <a:schemeClr val="tx1"/>
-                </a:solidFill>
-                <a:latin typeface="Times New Roman" panose="02020603050405020304" pitchFamily="18" charset="0"/>
-                <a:cs typeface="Times New Roman" panose="02020603050405020304" pitchFamily="18" charset="0"/>
-              </a:rPr>
-              <a:t>5.3. Boas práticas de programação para o desenvolvimento do software embarcado nos microcontroladores</a:t>
-            </a:r>
-          </a:p>
-          <a:p>
-            <a:pPr marL="0" indent="0" algn="just" eaLnBrk="0" hangingPunct="0">
-              <a:buNone/>
-            </a:pPr>
-            <a:r>
-              <a:rPr lang="pt-BR" sz="2200" dirty="0">
-                <a:solidFill>
-                  <a:schemeClr val="tx1"/>
-                </a:solidFill>
-                <a:latin typeface="Times New Roman" panose="02020603050405020304" pitchFamily="18" charset="0"/>
-                <a:cs typeface="Times New Roman" panose="02020603050405020304" pitchFamily="18" charset="0"/>
-              </a:rPr>
-              <a:t>5.4. Microcontroladores para projetos de comunicação sem fio e internet das coisas (IOT)</a:t>
-            </a:r>
-          </a:p>
-          <a:p>
-            <a:pPr marL="0" indent="0" algn="just" eaLnBrk="0" hangingPunct="0">
-              <a:buNone/>
-            </a:pPr>
-            <a:r>
-              <a:rPr lang="pt-BR" sz="2200" dirty="0">
-                <a:solidFill>
-                  <a:schemeClr val="tx1"/>
-                </a:solidFill>
-                <a:latin typeface="Times New Roman" panose="02020603050405020304" pitchFamily="18" charset="0"/>
-                <a:cs typeface="Times New Roman" panose="02020603050405020304" pitchFamily="18" charset="0"/>
-              </a:rPr>
-              <a:t>	.</a:t>
-            </a:r>
-          </a:p>
-        </p:txBody>
-      </p:sp>
-      <p:cxnSp>
-        <p:nvCxnSpPr>
-          <p:cNvPr id="4" name="Conector reto 3">
-            <a:extLst>
-              <a:ext uri="{FF2B5EF4-FFF2-40B4-BE49-F238E27FC236}">
-                <a16:creationId xmlns:a16="http://schemas.microsoft.com/office/drawing/2014/main" id="{53C1D5BE-B08D-43BA-9100-4319F7669DAD}"/>
-              </a:ext>
-            </a:extLst>
-          </p:cNvPr>
-          <p:cNvCxnSpPr>
-            <a:cxnSpLocks/>
-          </p:cNvCxnSpPr>
-          <p:nvPr/>
-        </p:nvCxnSpPr>
-        <p:spPr>
-          <a:xfrm flipV="1">
-            <a:off x="310728" y="902136"/>
-            <a:ext cx="8699160" cy="40954"/>
-          </a:xfrm>
-          <a:prstGeom prst="line">
-            <a:avLst/>
-          </a:prstGeom>
-          <a:ln w="38100">
-            <a:headEnd type="none" w="med" len="med"/>
-            <a:tailEnd type="none" w="med" len="med"/>
-          </a:ln>
-          <a:scene3d>
-            <a:camera prst="orthographicFront"/>
-            <a:lightRig rig="threePt" dir="t"/>
-          </a:scene3d>
-          <a:sp3d>
-            <a:bevelT prst="convex"/>
-          </a:sp3d>
-        </p:spPr>
-        <p:style>
-          <a:lnRef idx="3">
-            <a:schemeClr val="accent1"/>
-          </a:lnRef>
-          <a:fillRef idx="0">
-            <a:schemeClr val="accent1"/>
-          </a:fillRef>
-          <a:effectRef idx="2">
-            <a:schemeClr val="accent1"/>
-          </a:effectRef>
-          <a:fontRef idx="minor">
-            <a:schemeClr val="tx1"/>
-          </a:fontRef>
-        </p:style>
-      </p:cxnSp>
-    </p:spTree>
-    <p:extLst>
-      <p:ext uri="{BB962C8B-B14F-4D97-AF65-F5344CB8AC3E}">
-        <p14:creationId xmlns:p14="http://schemas.microsoft.com/office/powerpoint/2010/main" val="1774241193"/>
       </p:ext>
     </p:extLst>
   </p:cSld>
@@ -8822,6 +9023,263 @@
           <a:lstStyle/>
           <a:p>
             <a:pPr marL="457200" indent="-457200" algn="just" eaLnBrk="0" hangingPunct="0">
+              <a:buAutoNum type="arabicPeriod" startAt="5"/>
+            </a:pPr>
+            <a:r>
+              <a:rPr lang="pt-BR" sz="2200" dirty="0">
+                <a:solidFill>
+                  <a:schemeClr val="tx1"/>
+                </a:solidFill>
+                <a:latin typeface="Times New Roman" panose="02020603050405020304" pitchFamily="18" charset="0"/>
+                <a:cs typeface="Times New Roman" panose="02020603050405020304" pitchFamily="18" charset="0"/>
+              </a:rPr>
+              <a:t>PROJETOS COM MICROCONTROLADORES</a:t>
+            </a:r>
+          </a:p>
+          <a:p>
+            <a:pPr marL="0" indent="0" algn="just" eaLnBrk="0" hangingPunct="0">
+              <a:buNone/>
+            </a:pPr>
+            <a:endParaRPr lang="pt-BR" sz="2200" dirty="0">
+              <a:solidFill>
+                <a:schemeClr val="tx1"/>
+              </a:solidFill>
+              <a:latin typeface="Times New Roman" panose="02020603050405020304" pitchFamily="18" charset="0"/>
+              <a:cs typeface="Times New Roman" panose="02020603050405020304" pitchFamily="18" charset="0"/>
+            </a:endParaRPr>
+          </a:p>
+          <a:p>
+            <a:pPr marL="0" indent="0" algn="just" eaLnBrk="0" hangingPunct="0">
+              <a:buNone/>
+            </a:pPr>
+            <a:r>
+              <a:rPr lang="pt-BR" sz="2200" dirty="0">
+                <a:solidFill>
+                  <a:schemeClr val="tx1"/>
+                </a:solidFill>
+                <a:latin typeface="Times New Roman" panose="02020603050405020304" pitchFamily="18" charset="0"/>
+                <a:cs typeface="Times New Roman" panose="02020603050405020304" pitchFamily="18" charset="0"/>
+              </a:rPr>
+              <a:t>5.1. Plataformas de hardware e software para um projeto com microcontrolador</a:t>
+            </a:r>
+          </a:p>
+          <a:p>
+            <a:pPr marL="0" indent="0" algn="just" eaLnBrk="0" hangingPunct="0">
+              <a:buNone/>
+            </a:pPr>
+            <a:r>
+              <a:rPr lang="pt-BR" sz="2200" dirty="0">
+                <a:solidFill>
+                  <a:schemeClr val="tx1"/>
+                </a:solidFill>
+                <a:latin typeface="Times New Roman" panose="02020603050405020304" pitchFamily="18" charset="0"/>
+                <a:cs typeface="Times New Roman" panose="02020603050405020304" pitchFamily="18" charset="0"/>
+              </a:rPr>
+              <a:t>5.2. Limitações dos microcontroladores para a especificação de projetos embarcados de alto desempenho</a:t>
+            </a:r>
+          </a:p>
+          <a:p>
+            <a:pPr marL="0" indent="0" algn="just" eaLnBrk="0" hangingPunct="0">
+              <a:buNone/>
+            </a:pPr>
+            <a:r>
+              <a:rPr lang="pt-BR" sz="2200" dirty="0">
+                <a:solidFill>
+                  <a:schemeClr val="tx1"/>
+                </a:solidFill>
+                <a:latin typeface="Times New Roman" panose="02020603050405020304" pitchFamily="18" charset="0"/>
+                <a:cs typeface="Times New Roman" panose="02020603050405020304" pitchFamily="18" charset="0"/>
+              </a:rPr>
+              <a:t>5.3. Boas práticas de programação para o desenvolvimento do software embarcado nos microcontroladores</a:t>
+            </a:r>
+          </a:p>
+          <a:p>
+            <a:pPr marL="0" indent="0" algn="just" eaLnBrk="0" hangingPunct="0">
+              <a:buNone/>
+            </a:pPr>
+            <a:r>
+              <a:rPr lang="pt-BR" sz="2200" dirty="0">
+                <a:solidFill>
+                  <a:schemeClr val="tx1"/>
+                </a:solidFill>
+                <a:latin typeface="Times New Roman" panose="02020603050405020304" pitchFamily="18" charset="0"/>
+                <a:cs typeface="Times New Roman" panose="02020603050405020304" pitchFamily="18" charset="0"/>
+              </a:rPr>
+              <a:t>5.4. Microcontroladores para projetos de comunicação sem fio e internet das coisas (IOT)</a:t>
+            </a:r>
+          </a:p>
+          <a:p>
+            <a:pPr marL="0" indent="0" algn="just" eaLnBrk="0" hangingPunct="0">
+              <a:buNone/>
+            </a:pPr>
+            <a:r>
+              <a:rPr lang="pt-BR" sz="2200" dirty="0">
+                <a:solidFill>
+                  <a:schemeClr val="tx1"/>
+                </a:solidFill>
+                <a:latin typeface="Times New Roman" panose="02020603050405020304" pitchFamily="18" charset="0"/>
+                <a:cs typeface="Times New Roman" panose="02020603050405020304" pitchFamily="18" charset="0"/>
+              </a:rPr>
+              <a:t>	.</a:t>
+            </a:r>
+          </a:p>
+        </p:txBody>
+      </p:sp>
+      <p:cxnSp>
+        <p:nvCxnSpPr>
+          <p:cNvPr id="4" name="Conector reto 3">
+            <a:extLst>
+              <a:ext uri="{FF2B5EF4-FFF2-40B4-BE49-F238E27FC236}">
+                <a16:creationId xmlns:a16="http://schemas.microsoft.com/office/drawing/2014/main" id="{53C1D5BE-B08D-43BA-9100-4319F7669DAD}"/>
+              </a:ext>
+            </a:extLst>
+          </p:cNvPr>
+          <p:cNvCxnSpPr>
+            <a:cxnSpLocks/>
+          </p:cNvCxnSpPr>
+          <p:nvPr/>
+        </p:nvCxnSpPr>
+        <p:spPr>
+          <a:xfrm flipV="1">
+            <a:off x="310728" y="902136"/>
+            <a:ext cx="8699160" cy="40954"/>
+          </a:xfrm>
+          <a:prstGeom prst="line">
+            <a:avLst/>
+          </a:prstGeom>
+          <a:ln w="38100">
+            <a:headEnd type="none" w="med" len="med"/>
+            <a:tailEnd type="none" w="med" len="med"/>
+          </a:ln>
+          <a:scene3d>
+            <a:camera prst="orthographicFront"/>
+            <a:lightRig rig="threePt" dir="t"/>
+          </a:scene3d>
+          <a:sp3d>
+            <a:bevelT prst="convex"/>
+          </a:sp3d>
+        </p:spPr>
+        <p:style>
+          <a:lnRef idx="3">
+            <a:schemeClr val="accent1"/>
+          </a:lnRef>
+          <a:fillRef idx="0">
+            <a:schemeClr val="accent1"/>
+          </a:fillRef>
+          <a:effectRef idx="2">
+            <a:schemeClr val="accent1"/>
+          </a:effectRef>
+          <a:fontRef idx="minor">
+            <a:schemeClr val="tx1"/>
+          </a:fontRef>
+        </p:style>
+      </p:cxnSp>
+    </p:spTree>
+    <p:extLst>
+      <p:ext uri="{BB962C8B-B14F-4D97-AF65-F5344CB8AC3E}">
+        <p14:creationId xmlns:p14="http://schemas.microsoft.com/office/powerpoint/2010/main" val="1774241193"/>
+      </p:ext>
+    </p:extLst>
+  </p:cSld>
+  <p:clrMapOvr>
+    <a:masterClrMapping/>
+  </p:clrMapOvr>
+  <p:transition spd="med"/>
+</p:sld>
+</file>
+
+<file path=ppt/slides/slide21.xml><?xml version="1.0" encoding="utf-8"?>
+<p:sld xmlns:a="http://schemas.openxmlformats.org/drawingml/2006/main" xmlns:r="http://schemas.openxmlformats.org/officeDocument/2006/relationships" xmlns:p="http://schemas.openxmlformats.org/presentationml/2006/main">
+  <p:cSld>
+    <p:spTree>
+      <p:nvGrpSpPr>
+        <p:cNvPr id="1" name=""/>
+        <p:cNvGrpSpPr/>
+        <p:nvPr/>
+      </p:nvGrpSpPr>
+      <p:grpSpPr>
+        <a:xfrm>
+          <a:off x="0" y="0"/>
+          <a:ext cx="0" cy="0"/>
+          <a:chOff x="0" y="0"/>
+          <a:chExt cx="0" cy="0"/>
+        </a:xfrm>
+      </p:grpSpPr>
+      <p:sp>
+        <p:nvSpPr>
+          <p:cNvPr id="6" name="Title 1"/>
+          <p:cNvSpPr>
+            <a:spLocks noGrp="1"/>
+          </p:cNvSpPr>
+          <p:nvPr>
+            <p:ph type="title"/>
+          </p:nvPr>
+        </p:nvSpPr>
+        <p:spPr>
+          <a:xfrm>
+            <a:off x="457200" y="205980"/>
+            <a:ext cx="8229600" cy="857251"/>
+          </a:xfrm>
+        </p:spPr>
+        <p:txBody>
+          <a:bodyPr/>
+          <a:lstStyle/>
+          <a:p>
+            <a:r>
+              <a:rPr lang="en-US" b="1" dirty="0" err="1">
+                <a:solidFill>
+                  <a:srgbClr val="0070C0"/>
+                </a:solidFill>
+              </a:rPr>
+              <a:t>Unidades</a:t>
+            </a:r>
+            <a:r>
+              <a:rPr lang="en-US" b="1" dirty="0">
+                <a:solidFill>
+                  <a:srgbClr val="0070C0"/>
+                </a:solidFill>
+              </a:rPr>
+              <a:t>/</a:t>
+            </a:r>
+            <a:r>
+              <a:rPr lang="en-US" b="1" dirty="0" err="1">
+                <a:solidFill>
+                  <a:srgbClr val="0070C0"/>
+                </a:solidFill>
+              </a:rPr>
+              <a:t>Conteúdos</a:t>
+            </a:r>
+            <a:endParaRPr lang="en-US" b="1" dirty="0">
+              <a:solidFill>
+                <a:srgbClr val="0070C0"/>
+              </a:solidFill>
+            </a:endParaRPr>
+          </a:p>
+        </p:txBody>
+      </p:sp>
+      <p:sp>
+        <p:nvSpPr>
+          <p:cNvPr id="8" name="Text Placeholder 2"/>
+          <p:cNvSpPr>
+            <a:spLocks noGrp="1"/>
+          </p:cNvSpPr>
+          <p:nvPr>
+            <p:ph type="body" sz="half" idx="1"/>
+          </p:nvPr>
+        </p:nvSpPr>
+        <p:spPr>
+          <a:xfrm>
+            <a:off x="142865" y="1104186"/>
+            <a:ext cx="8865056" cy="3943803"/>
+          </a:xfrm>
+        </p:spPr>
+        <p:txBody>
+          <a:bodyPr>
+            <a:noAutofit/>
+          </a:bodyPr>
+          <a:lstStyle/>
+          <a:p>
+            <a:pPr marL="457200" indent="-457200" algn="just" eaLnBrk="0" hangingPunct="0">
               <a:buAutoNum type="arabicPeriod" startAt="6"/>
             </a:pPr>
             <a:r>
@@ -8920,7 +9378,7 @@
 </p:sld>
 </file>
 
-<file path=ppt/slides/slide21.xml><?xml version="1.0" encoding="utf-8"?>
+<file path=ppt/slides/slide22.xml><?xml version="1.0" encoding="utf-8"?>
 <p:sld xmlns:a="http://schemas.openxmlformats.org/drawingml/2006/main" xmlns:r="http://schemas.openxmlformats.org/officeDocument/2006/relationships" xmlns:p="http://schemas.openxmlformats.org/presentationml/2006/main">
   <p:cSld>
     <p:spTree>
@@ -9215,7 +9673,7 @@
 </p:sld>
 </file>
 
-<file path=ppt/slides/slide22.xml><?xml version="1.0" encoding="utf-8"?>
+<file path=ppt/slides/slide23.xml><?xml version="1.0" encoding="utf-8"?>
 <p:sld xmlns:a="http://schemas.openxmlformats.org/drawingml/2006/main" xmlns:r="http://schemas.openxmlformats.org/officeDocument/2006/relationships" xmlns:p="http://schemas.openxmlformats.org/presentationml/2006/main">
   <p:cSld>
     <p:spTree>
@@ -9579,7 +10037,7 @@
 </p:sld>
 </file>
 
-<file path=ppt/slides/slide23.xml><?xml version="1.0" encoding="utf-8"?>
+<file path=ppt/slides/slide24.xml><?xml version="1.0" encoding="utf-8"?>
 <p:sld xmlns:a="http://schemas.openxmlformats.org/drawingml/2006/main" xmlns:r="http://schemas.openxmlformats.org/officeDocument/2006/relationships" xmlns:p="http://schemas.openxmlformats.org/presentationml/2006/main">
   <p:cSld>
     <p:spTree>
@@ -10023,7 +10481,7 @@
 </p:sld>
 </file>
 
-<file path=ppt/slides/slide24.xml><?xml version="1.0" encoding="utf-8"?>
+<file path=ppt/slides/slide25.xml><?xml version="1.0" encoding="utf-8"?>
 <p:sld xmlns:a="http://schemas.openxmlformats.org/drawingml/2006/main" xmlns:r="http://schemas.openxmlformats.org/officeDocument/2006/relationships" xmlns:p="http://schemas.openxmlformats.org/presentationml/2006/main">
   <p:cSld>
     <p:spTree>
@@ -10487,7 +10945,7 @@
 </p:sld>
 </file>
 
-<file path=ppt/slides/slide25.xml><?xml version="1.0" encoding="utf-8"?>
+<file path=ppt/slides/slide26.xml><?xml version="1.0" encoding="utf-8"?>
 <p:sld xmlns:a="http://schemas.openxmlformats.org/drawingml/2006/main" xmlns:r="http://schemas.openxmlformats.org/officeDocument/2006/relationships" xmlns:p="http://schemas.openxmlformats.org/presentationml/2006/main">
   <p:cSld>
     <p:spTree>
@@ -10839,7 +11297,7 @@
 </p:sld>
 </file>
 
-<file path=ppt/slides/slide26.xml><?xml version="1.0" encoding="utf-8"?>
+<file path=ppt/slides/slide27.xml><?xml version="1.0" encoding="utf-8"?>
 <p:sld xmlns:a="http://schemas.openxmlformats.org/drawingml/2006/main" xmlns:r="http://schemas.openxmlformats.org/officeDocument/2006/relationships" xmlns:p="http://schemas.openxmlformats.org/presentationml/2006/main">
   <p:cSld>
     <p:spTree>
@@ -13671,7 +14129,7 @@
                 <a:latin typeface="Times New Roman" panose="02020603050405020304" pitchFamily="18" charset="0"/>
                 <a:cs typeface="Times New Roman" panose="02020603050405020304" pitchFamily="18" charset="0"/>
               </a:rPr>
-              <a:t>Famílias de Controladores / Fabricantes</a:t>
+              <a:t>Famílias de Microcontroladores / Fabricantes</a:t>
             </a:r>
             <a:endParaRPr lang="pt-BR" altLang="pt-BR" sz="2400" dirty="0">
               <a:solidFill>

</xml_diff>

<commit_message>
Apresentação disciplina Microcontroladores - ok
</commit_message>
<xml_diff>
--- a/Apresentação - Programação Microcontroladores.pptx
+++ b/Apresentação - Programação Microcontroladores.pptx
@@ -6275,6 +6275,30 @@
             <a:pPr marL="0" indent="0" algn="just" eaLnBrk="0" hangingPunct="0">
               <a:buNone/>
             </a:pPr>
+            <a:endParaRPr lang="pt-BR" altLang="pt-BR" sz="2400">
+              <a:solidFill>
+                <a:schemeClr val="tx1"/>
+              </a:solidFill>
+              <a:latin typeface="Times New Roman" panose="02020603050405020304" pitchFamily="18" charset="0"/>
+              <a:cs typeface="Times New Roman" panose="02020603050405020304" pitchFamily="18" charset="0"/>
+              <a:hlinkClick r:id="rId3"/>
+            </a:endParaRPr>
+          </a:p>
+          <a:p>
+            <a:pPr marL="0" indent="0" algn="just" eaLnBrk="0" hangingPunct="0">
+              <a:buNone/>
+            </a:pPr>
+            <a:r>
+              <a:rPr lang="pt-BR" altLang="pt-BR" sz="2400">
+                <a:solidFill>
+                  <a:schemeClr val="tx1"/>
+                </a:solidFill>
+                <a:latin typeface="Times New Roman" panose="02020603050405020304" pitchFamily="18" charset="0"/>
+                <a:cs typeface="Times New Roman" panose="02020603050405020304" pitchFamily="18" charset="0"/>
+                <a:hlinkClick r:id="rId3"/>
+              </a:rPr>
+              <a:t>https</a:t>
+            </a:r>
             <a:r>
               <a:rPr lang="pt-BR" altLang="pt-BR" sz="2400" dirty="0">
                 <a:solidFill>
@@ -6284,7 +6308,7 @@
                 <a:cs typeface="Times New Roman" panose="02020603050405020304" pitchFamily="18" charset="0"/>
                 <a:hlinkClick r:id="rId3"/>
               </a:rPr>
-              <a:t>https://youtu.be/cNN_tTXABUA</a:t>
+              <a:t>://youtu.be/cNN_tTXABUA</a:t>
             </a:r>
             <a:endParaRPr lang="pt-BR" altLang="pt-BR" sz="2400" dirty="0">
               <a:solidFill>
@@ -6298,41 +6322,6 @@
             <a:pPr marL="0" indent="0" algn="just" eaLnBrk="0" hangingPunct="0">
               <a:buNone/>
             </a:pPr>
-            <a:endParaRPr lang="pt-BR" altLang="pt-BR" sz="2400" dirty="0">
-              <a:solidFill>
-                <a:schemeClr val="tx1"/>
-              </a:solidFill>
-              <a:latin typeface="Times New Roman" panose="02020603050405020304" pitchFamily="18" charset="0"/>
-              <a:cs typeface="Times New Roman" panose="02020603050405020304" pitchFamily="18" charset="0"/>
-            </a:endParaRPr>
-          </a:p>
-          <a:p>
-            <a:pPr marL="0" indent="0" algn="just" eaLnBrk="0" hangingPunct="0">
-              <a:buNone/>
-            </a:pPr>
-            <a:endParaRPr lang="pt-BR" altLang="pt-BR" sz="2400" dirty="0">
-              <a:solidFill>
-                <a:schemeClr val="tx1"/>
-              </a:solidFill>
-              <a:latin typeface="Times New Roman" panose="02020603050405020304" pitchFamily="18" charset="0"/>
-              <a:cs typeface="Times New Roman" panose="02020603050405020304" pitchFamily="18" charset="0"/>
-            </a:endParaRPr>
-          </a:p>
-          <a:p>
-            <a:pPr marL="0" indent="0" algn="just" eaLnBrk="0" hangingPunct="0">
-              <a:buNone/>
-            </a:pPr>
-            <a:r>
-              <a:rPr lang="pt-BR" altLang="pt-BR" sz="2400" dirty="0">
-                <a:solidFill>
-                  <a:schemeClr val="tx1"/>
-                </a:solidFill>
-                <a:latin typeface="Times New Roman" panose="02020603050405020304" pitchFamily="18" charset="0"/>
-                <a:cs typeface="Times New Roman" panose="02020603050405020304" pitchFamily="18" charset="0"/>
-                <a:hlinkClick r:id="rId4"/>
-              </a:rPr>
-              <a:t>https://chat.whatsapp.com/F3WeHnyypkA6N444UBewnG</a:t>
-            </a:r>
             <a:endParaRPr lang="pt-BR" altLang="pt-BR" sz="2400" dirty="0">
               <a:solidFill>
                 <a:schemeClr val="tx1"/>

</xml_diff>